<commit_message>
Changes to sprint 4 presentaion
</commit_message>
<xml_diff>
--- a/docs/Sprint4/Sprint 4 Presentation.pptx
+++ b/docs/Sprint4/Sprint 4 Presentation.pptx
@@ -1105,7 +1105,7 @@
             <a:rPr lang="en-US" dirty="0">
               <a:latin typeface="Franklin Gothic Demi" panose="020B0502020104020203"/>
             </a:rPr>
-            <a:t>Sprint 5 (18.12.2020)</a:t>
+            <a:t>Sprint 5 (08.01.2021)</a:t>
           </a:r>
           <a:endParaRPr lang="en-US" dirty="0"/>
         </a:p>
@@ -1194,7 +1194,19 @@
             <a:rPr lang="en-US" dirty="0">
               <a:latin typeface="Franklin Gothic Demi" panose="020B0502020104020203"/>
             </a:rPr>
-            <a:t>Sprint 6 (08.01.2021)</a:t>
+            <a:t>Sprint 6 (</a:t>
+          </a:r>
+          <a:r>
+            <a:rPr lang="bg-BG" dirty="0">
+              <a:latin typeface="Franklin Gothic Demi" panose="020B0502020104020203"/>
+            </a:rPr>
+            <a:t>1</a:t>
+          </a:r>
+          <a:r>
+            <a:rPr lang="en-US">
+              <a:latin typeface="Franklin Gothic Demi" panose="020B0502020104020203"/>
+            </a:rPr>
+            <a:t>5.01.2021)</a:t>
           </a:r>
           <a:endParaRPr lang="en-US" dirty="0"/>
         </a:p>
@@ -1943,7 +1955,7 @@
             <a:rPr lang="en-US" sz="1300" kern="1200" dirty="0">
               <a:latin typeface="Franklin Gothic Demi" panose="020B0502020104020203"/>
             </a:rPr>
-            <a:t>Sprint 5 (18.12.2020)</a:t>
+            <a:t>Sprint 5 (08.01.2021)</a:t>
           </a:r>
           <a:endParaRPr lang="en-US" sz="1300" kern="1200" dirty="0"/>
         </a:p>
@@ -2239,7 +2251,19 @@
             <a:rPr lang="en-US" sz="1300" kern="1200" dirty="0">
               <a:latin typeface="Franklin Gothic Demi" panose="020B0502020104020203"/>
             </a:rPr>
-            <a:t>Sprint 6 (08.01.2021)</a:t>
+            <a:t>Sprint 6 (</a:t>
+          </a:r>
+          <a:r>
+            <a:rPr lang="bg-BG" sz="1300" kern="1200" dirty="0">
+              <a:latin typeface="Franklin Gothic Demi" panose="020B0502020104020203"/>
+            </a:rPr>
+            <a:t>1</a:t>
+          </a:r>
+          <a:r>
+            <a:rPr lang="en-US" sz="1300" kern="1200">
+              <a:latin typeface="Franklin Gothic Demi" panose="020B0502020104020203"/>
+            </a:rPr>
+            <a:t>5.01.2021)</a:t>
           </a:r>
           <a:endParaRPr lang="en-US" sz="1300" kern="1200" dirty="0"/>
         </a:p>
@@ -4100,7 +4124,7 @@
           <a:p>
             <a:fld id="{4B3F774C-70F7-4ED4-813C-739E51CF8487}" type="datetimeFigureOut">
               <a:rPr lang="en-US" smtClean="0"/>
-              <a:t>10-Dec-20</a:t>
+              <a:t>11-Dec-20</a:t>
             </a:fld>
             <a:endParaRPr lang="en-US" dirty="0"/>
           </a:p>
@@ -4869,7 +4893,7 @@
           <a:p>
             <a:fld id="{F9F2E34D-57B0-41D5-A7AF-DF10D1068115}" type="datetime1">
               <a:rPr lang="en-US" smtClean="0"/>
-              <a:t>10-Dec-20</a:t>
+              <a:t>11-Dec-20</a:t>
             </a:fld>
             <a:endParaRPr lang="en-US" dirty="0"/>
           </a:p>
@@ -5161,7 +5185,7 @@
           <a:p>
             <a:fld id="{DF6E8327-77F4-4A2B-9238-101C8E3404E4}" type="datetime1">
               <a:rPr lang="en-US" smtClean="0"/>
-              <a:t>10-Dec-20</a:t>
+              <a:t>11-Dec-20</a:t>
             </a:fld>
             <a:endParaRPr lang="en-US" dirty="0"/>
           </a:p>
@@ -5405,7 +5429,7 @@
           <a:p>
             <a:fld id="{5287327A-3B7B-4F18-AD00-4892CF91FF9D}" type="datetime1">
               <a:rPr lang="en-US" smtClean="0"/>
-              <a:t>10-Dec-20</a:t>
+              <a:t>11-Dec-20</a:t>
             </a:fld>
             <a:endParaRPr lang="en-US" dirty="0"/>
           </a:p>
@@ -5941,7 +5965,7 @@
           <a:p>
             <a:fld id="{84398241-E647-4007-AB01-BB30869910EB}" type="datetime1">
               <a:rPr lang="en-US" smtClean="0"/>
-              <a:t>10-Dec-20</a:t>
+              <a:t>11-Dec-20</a:t>
             </a:fld>
             <a:endParaRPr lang="en-US" dirty="0"/>
           </a:p>
@@ -6185,7 +6209,7 @@
           <a:p>
             <a:fld id="{A09F5554-C941-4C3B-A197-75ED448862A0}" type="datetime1">
               <a:rPr lang="en-US" smtClean="0"/>
-              <a:t>10-Dec-20</a:t>
+              <a:t>11-Dec-20</a:t>
             </a:fld>
             <a:endParaRPr lang="en-US" dirty="0"/>
           </a:p>
@@ -6713,7 +6737,7 @@
           <a:p>
             <a:fld id="{DC6B44A0-C3F8-4023-9352-7CF7C034B2C8}" type="datetime1">
               <a:rPr lang="en-US" smtClean="0"/>
-              <a:t>10-Dec-20</a:t>
+              <a:t>11-Dec-20</a:t>
             </a:fld>
             <a:endParaRPr lang="en-US" dirty="0"/>
           </a:p>
@@ -7006,7 +7030,7 @@
           <a:p>
             <a:fld id="{79C3DC5B-471F-47EA-B884-FE923235A560}" type="datetime1">
               <a:rPr lang="en-US" smtClean="0"/>
-              <a:t>10-Dec-20</a:t>
+              <a:t>11-Dec-20</a:t>
             </a:fld>
             <a:endParaRPr lang="en-US" dirty="0"/>
           </a:p>
@@ -7176,7 +7200,7 @@
           <a:p>
             <a:fld id="{03F8C408-3247-4796-93FF-B91D6887AEC0}" type="datetime1">
               <a:rPr lang="en-US" smtClean="0"/>
-              <a:t>10-Dec-20</a:t>
+              <a:t>11-Dec-20</a:t>
             </a:fld>
             <a:endParaRPr lang="en-US" dirty="0"/>
           </a:p>
@@ -7352,7 +7376,7 @@
           <a:p>
             <a:fld id="{BBA1D282-CC74-49F4-B876-75084EFB56F1}" type="datetime1">
               <a:rPr lang="en-US" smtClean="0"/>
-              <a:t>10-Dec-20</a:t>
+              <a:t>11-Dec-20</a:t>
             </a:fld>
             <a:endParaRPr lang="en-US" dirty="0"/>
           </a:p>
@@ -7518,7 +7542,7 @@
           <a:p>
             <a:fld id="{BF56EAF9-2583-4989-8D87-13F548ED6E0C}" type="datetime1">
               <a:rPr lang="en-US" smtClean="0"/>
-              <a:t>10-Dec-20</a:t>
+              <a:t>11-Dec-20</a:t>
             </a:fld>
             <a:endParaRPr lang="en-US" dirty="0"/>
           </a:p>
@@ -7765,7 +7789,7 @@
           <a:p>
             <a:fld id="{B70E3CFB-BB1B-4B2A-ADF6-B1A4609854C4}" type="datetime1">
               <a:rPr lang="en-US" smtClean="0"/>
-              <a:t>10-Dec-20</a:t>
+              <a:t>11-Dec-20</a:t>
             </a:fld>
             <a:endParaRPr lang="en-US" dirty="0"/>
           </a:p>
@@ -8058,7 +8082,7 @@
           <a:p>
             <a:fld id="{2B3AEAA8-1A97-412E-935C-2E918F139579}" type="datetime1">
               <a:rPr lang="en-US" smtClean="0"/>
-              <a:t>10-Dec-20</a:t>
+              <a:t>11-Dec-20</a:t>
             </a:fld>
             <a:endParaRPr lang="en-US" dirty="0"/>
           </a:p>
@@ -8496,7 +8520,7 @@
           <a:p>
             <a:fld id="{638B0DF1-CA1F-4E36-8C65-C52A9896A8FB}" type="datetime1">
               <a:rPr lang="en-US" smtClean="0"/>
-              <a:t>10-Dec-20</a:t>
+              <a:t>11-Dec-20</a:t>
             </a:fld>
             <a:endParaRPr lang="en-US" dirty="0"/>
           </a:p>
@@ -8610,7 +8634,7 @@
           <a:p>
             <a:fld id="{DB6173FD-197A-4AD6-8D60-38B6A76F0734}" type="datetime1">
               <a:rPr lang="en-US" smtClean="0"/>
-              <a:t>10-Dec-20</a:t>
+              <a:t>11-Dec-20</a:t>
             </a:fld>
             <a:endParaRPr lang="en-US" dirty="0"/>
           </a:p>
@@ -8701,7 +8725,7 @@
           <a:p>
             <a:fld id="{6BDC3949-07FA-4C7A-A990-D6D1043EED71}" type="datetime1">
               <a:rPr lang="en-US" smtClean="0"/>
-              <a:t>10-Dec-20</a:t>
+              <a:t>11-Dec-20</a:t>
             </a:fld>
             <a:endParaRPr lang="en-US" dirty="0"/>
           </a:p>
@@ -8980,7 +9004,7 @@
           <a:p>
             <a:fld id="{2E9E2DE8-6D13-4218-A974-D45AA7B6E4FF}" type="datetime1">
               <a:rPr lang="en-US" smtClean="0"/>
-              <a:t>10-Dec-20</a:t>
+              <a:t>11-Dec-20</a:t>
             </a:fld>
             <a:endParaRPr lang="en-US" dirty="0"/>
           </a:p>
@@ -9267,7 +9291,7 @@
           <a:p>
             <a:fld id="{9CDAB7D7-4BDA-4ABC-B31D-66201C69A314}" type="datetime1">
               <a:rPr lang="en-US" smtClean="0"/>
-              <a:t>10-Dec-20</a:t>
+              <a:t>11-Dec-20</a:t>
             </a:fld>
             <a:endParaRPr lang="en-US" dirty="0"/>
           </a:p>
@@ -9793,7 +9817,7 @@
           <a:p>
             <a:fld id="{4E3F0A0B-291C-4112-A023-023C51AB2E85}" type="datetime1">
               <a:rPr lang="en-US" smtClean="0"/>
-              <a:t>10-Dec-20</a:t>
+              <a:t>11-Dec-20</a:t>
             </a:fld>
             <a:endParaRPr lang="en-US" dirty="0"/>
           </a:p>
@@ -12683,7 +12707,7 @@
           <p:nvPr>
             <p:extLst>
               <p:ext uri="{D42A27DB-BD31-4B8C-83A1-F6EECF244321}">
-                <p14:modId xmlns:p14="http://schemas.microsoft.com/office/powerpoint/2010/main" val="1051473719"/>
+                <p14:modId xmlns:p14="http://schemas.microsoft.com/office/powerpoint/2010/main" val="2841446986"/>
               </p:ext>
             </p:extLst>
           </p:nvPr>
@@ -13299,6 +13323,14 @@
 </file>
 
 <file path=customXml/item1.xml><?xml version="1.0" encoding="utf-8"?>
+<p:properties xmlns:p="http://schemas.microsoft.com/office/2006/metadata/properties" xmlns:xsi="http://www.w3.org/2001/XMLSchema-instance" xmlns:pc="http://schemas.microsoft.com/office/infopath/2007/PartnerControls">
+  <documentManagement>
+    <MediaServiceKeyPoints xmlns="71af3243-3dd4-4a8d-8c0d-dd76da1f02a5" xsi:nil="true"/>
+  </documentManagement>
+</p:properties>
+</file>
+
+<file path=customXml/item2.xml><?xml version="1.0" encoding="utf-8"?>
 <ct:contentTypeSchema xmlns:ct="http://schemas.microsoft.com/office/2006/metadata/contentType" xmlns:ma="http://schemas.microsoft.com/office/2006/metadata/properties/metaAttributes" ct:_="" ma:_="" ma:contentTypeName="Document" ma:contentTypeID="0x01010079F111ED35F8CC479449609E8A0923A6" ma:contentTypeVersion="11" ma:contentTypeDescription="Create a new document." ma:contentTypeScope="" ma:versionID="9677210f24a1be23c92c90fd886aa0aa">
   <xsd:schema xmlns:xsd="http://www.w3.org/2001/XMLSchema" xmlns:xs="http://www.w3.org/2001/XMLSchema" xmlns:p="http://schemas.microsoft.com/office/2006/metadata/properties" xmlns:ns2="71af3243-3dd4-4a8d-8c0d-dd76da1f02a5" xmlns:ns3="16c05727-aa75-4e4a-9b5f-8a80a1165891" targetNamespace="http://schemas.microsoft.com/office/2006/metadata/properties" ma:root="true" ma:fieldsID="60e05723c5c1908df1a1a4ebf11d344e" ns2:_="" ns3:_="">
     <xsd:import namespace="71af3243-3dd4-4a8d-8c0d-dd76da1f02a5"/>
@@ -13509,14 +13541,6 @@
 </ct:contentTypeSchema>
 </file>
 
-<file path=customXml/item2.xml><?xml version="1.0" encoding="utf-8"?>
-<p:properties xmlns:p="http://schemas.microsoft.com/office/2006/metadata/properties" xmlns:xsi="http://www.w3.org/2001/XMLSchema-instance" xmlns:pc="http://schemas.microsoft.com/office/infopath/2007/PartnerControls">
-  <documentManagement>
-    <MediaServiceKeyPoints xmlns="71af3243-3dd4-4a8d-8c0d-dd76da1f02a5" xsi:nil="true"/>
-  </documentManagement>
-</p:properties>
-</file>
-
 <file path=customXml/item3.xml><?xml version="1.0" encoding="utf-8"?>
 <?mso-contentType ?>
 <FormTemplates xmlns="http://schemas.microsoft.com/sharepoint/v3/contenttype/forms">
@@ -13527,6 +13551,16 @@
 </file>
 
 <file path=customXml/itemProps1.xml><?xml version="1.0" encoding="utf-8"?>
+<ds:datastoreItem xmlns:ds="http://schemas.openxmlformats.org/officeDocument/2006/customXml" ds:itemID="{D7023227-530E-4024-91EF-312A851A758C}">
+  <ds:schemaRefs>
+    <ds:schemaRef ds:uri="http://schemas.microsoft.com/office/2006/metadata/properties"/>
+    <ds:schemaRef ds:uri="http://schemas.microsoft.com/office/infopath/2007/PartnerControls"/>
+    <ds:schemaRef ds:uri="71af3243-3dd4-4a8d-8c0d-dd76da1f02a5"/>
+  </ds:schemaRefs>
+</ds:datastoreItem>
+</file>
+
+<file path=customXml/itemProps2.xml><?xml version="1.0" encoding="utf-8"?>
 <ds:datastoreItem xmlns:ds="http://schemas.openxmlformats.org/officeDocument/2006/customXml" ds:itemID="{627C19A7-3107-4CB2-BD0D-F7C79BE028CC}">
   <ds:schemaRefs>
     <ds:schemaRef ds:uri="http://schemas.microsoft.com/office/2006/metadata/contentType"/>
@@ -13545,16 +13579,6 @@
 </ds:datastoreItem>
 </file>
 
-<file path=customXml/itemProps2.xml><?xml version="1.0" encoding="utf-8"?>
-<ds:datastoreItem xmlns:ds="http://schemas.openxmlformats.org/officeDocument/2006/customXml" ds:itemID="{D7023227-530E-4024-91EF-312A851A758C}">
-  <ds:schemaRefs>
-    <ds:schemaRef ds:uri="http://schemas.microsoft.com/office/2006/metadata/properties"/>
-    <ds:schemaRef ds:uri="http://schemas.microsoft.com/office/infopath/2007/PartnerControls"/>
-    <ds:schemaRef ds:uri="71af3243-3dd4-4a8d-8c0d-dd76da1f02a5"/>
-  </ds:schemaRefs>
-</ds:datastoreItem>
-</file>
-
 <file path=customXml/itemProps3.xml><?xml version="1.0" encoding="utf-8"?>
 <ds:datastoreItem xmlns:ds="http://schemas.openxmlformats.org/officeDocument/2006/customXml" ds:itemID="{33315AA3-EAE3-44ED-8368-BAC2FFFB4817}">
   <ds:schemaRefs>

</xml_diff>